<commit_message>
add memory_manage0.md and peephole.ppt
</commit_message>
<xml_diff>
--- a/docs/lab_material/peephole.pptx
+++ b/docs/lab_material/peephole.pptx
@@ -5,13 +5,15 @@
     <p:sldMasterId id="2147483648" r:id="rId1"/>
   </p:sldMasterIdLst>
   <p:notesMasterIdLst>
-    <p:notesMasterId r:id="rId4"/>
+    <p:notesMasterId r:id="rId6"/>
   </p:notesMasterIdLst>
   <p:handoutMasterIdLst>
-    <p:handoutMasterId r:id="rId5"/>
+    <p:handoutMasterId r:id="rId7"/>
   </p:handoutMasterIdLst>
   <p:sldIdLst>
     <p:sldId id="257" r:id="rId3"/>
+    <p:sldId id="258" r:id="rId4"/>
+    <p:sldId id="259" r:id="rId5"/>
   </p:sldIdLst>
   <p:sldSz cx="12192000" cy="6858000"/>
   <p:notesSz cx="7103745" cy="10234295"/>
@@ -3563,7 +3565,7 @@
         <p:spPr>
           <a:xfrm>
             <a:off x="513080" y="2005965"/>
-            <a:ext cx="8601075" cy="2122805"/>
+            <a:ext cx="8601075" cy="2553335"/>
           </a:xfrm>
           <a:prstGeom prst="rect">
             <a:avLst/>
@@ -3576,75 +3578,744 @@
           </a:bodyPr>
           <a:p>
             <a:r>
+              <a:rPr lang="en-US" altLang="zh-CN" sz="2000">
+                <a:latin typeface="+mj-ea"/>
+                <a:ea typeface="+mj-ea"/>
+                <a:cs typeface="+mj-ea"/>
+              </a:rPr>
+              <a:t>1.Peek is a first step toward adding support for assembly-level program analyses, transformations, and optimizations in CompCert: </a:t>
+            </a:r>
+            <a:r>
+              <a:rPr sz="2000">
+                <a:latin typeface="+mj-ea"/>
+                <a:ea typeface="+mj-ea"/>
+                <a:cs typeface="+mj-ea"/>
+              </a:rPr>
+              <a:t>https://compcert.org/</a:t>
+            </a:r>
+            <a:endParaRPr sz="2000">
+              <a:latin typeface="+mj-ea"/>
+              <a:ea typeface="+mj-ea"/>
+              <a:cs typeface="+mj-ea"/>
+            </a:endParaRPr>
+          </a:p>
+          <a:p>
+            <a:endParaRPr lang="en-US" altLang="zh-CN" sz="2000">
+              <a:latin typeface="+mj-ea"/>
+              <a:ea typeface="+mj-ea"/>
+              <a:cs typeface="+mj-ea"/>
+            </a:endParaRPr>
+          </a:p>
+          <a:p>
+            <a:r>
+              <a:rPr lang="en-US" altLang="zh-CN" sz="2000">
+                <a:latin typeface="+mj-ea"/>
+                <a:ea typeface="+mj-ea"/>
+                <a:cs typeface="+mj-ea"/>
+              </a:rPr>
+              <a:t>2. </a:t>
+            </a:r>
+            <a:r>
+              <a:rPr sz="2000">
+                <a:latin typeface="+mj-ea"/>
+                <a:ea typeface="+mj-ea"/>
+                <a:cs typeface="+mj-ea"/>
+              </a:rPr>
+              <a:t>Peek</a:t>
+            </a:r>
+            <a:r>
+              <a:rPr lang="en-US" sz="2000">
+                <a:latin typeface="+mj-ea"/>
+                <a:ea typeface="+mj-ea"/>
+                <a:cs typeface="+mj-ea"/>
+              </a:rPr>
+              <a:t> </a:t>
+            </a:r>
+            <a:r>
+              <a:rPr sz="2000">
+                <a:latin typeface="+mj-ea"/>
+                <a:ea typeface="+mj-ea"/>
+                <a:cs typeface="+mj-ea"/>
+              </a:rPr>
+              <a:t>provides an x86-level liveness analysis over registers</a:t>
+            </a:r>
+            <a:endParaRPr sz="2000">
+              <a:latin typeface="+mj-ea"/>
+              <a:ea typeface="+mj-ea"/>
+              <a:cs typeface="+mj-ea"/>
+            </a:endParaRPr>
+          </a:p>
+          <a:p>
+            <a:r>
+              <a:rPr lang="zh-CN" altLang="en-US" sz="2000">
+                <a:latin typeface="+mj-ea"/>
+                <a:ea typeface="+mj-ea"/>
+                <a:cs typeface="+mj-ea"/>
+              </a:rPr>
+              <a:t>把寄存器分成</a:t>
+            </a:r>
+            <a:r>
+              <a:rPr lang="en-US" altLang="zh-CN" sz="2000">
+                <a:latin typeface="+mj-ea"/>
+                <a:ea typeface="+mj-ea"/>
+                <a:cs typeface="+mj-ea"/>
+              </a:rPr>
+              <a:t>live_in </a:t>
+            </a:r>
+            <a:r>
+              <a:rPr lang="zh-CN" altLang="en-US" sz="2000">
+                <a:latin typeface="+mj-ea"/>
+                <a:ea typeface="+mj-ea"/>
+                <a:cs typeface="+mj-ea"/>
+              </a:rPr>
+              <a:t>，</a:t>
+            </a:r>
+            <a:r>
+              <a:rPr lang="en-US" altLang="zh-CN" sz="2000">
+                <a:latin typeface="+mj-ea"/>
+                <a:ea typeface="+mj-ea"/>
+                <a:cs typeface="+mj-ea"/>
+              </a:rPr>
+              <a:t>live_out</a:t>
+            </a:r>
+            <a:r>
+              <a:rPr lang="zh-CN" altLang="en-US" sz="2000">
+                <a:latin typeface="+mj-ea"/>
+                <a:ea typeface="+mj-ea"/>
+                <a:cs typeface="+mj-ea"/>
+              </a:rPr>
+              <a:t>，</a:t>
+            </a:r>
+            <a:r>
+              <a:rPr lang="en-US" altLang="zh-CN" sz="2000">
+                <a:latin typeface="+mj-ea"/>
+                <a:ea typeface="+mj-ea"/>
+                <a:cs typeface="+mj-ea"/>
+              </a:rPr>
+              <a:t> pres(</a:t>
+            </a:r>
+            <a:r>
+              <a:rPr lang="zh-CN" altLang="en-US" sz="2000">
+                <a:latin typeface="+mj-ea"/>
+                <a:ea typeface="+mj-ea"/>
+                <a:cs typeface="+mj-ea"/>
+              </a:rPr>
+              <a:t>没有影响的寄存器列表</a:t>
+            </a:r>
+            <a:r>
+              <a:rPr lang="en-US" altLang="zh-CN" sz="2000">
+                <a:latin typeface="+mj-ea"/>
+                <a:ea typeface="+mj-ea"/>
+                <a:cs typeface="+mj-ea"/>
+              </a:rPr>
+              <a:t>)</a:t>
+            </a:r>
+            <a:endParaRPr lang="en-US" altLang="zh-CN" sz="2000">
+              <a:latin typeface="+mj-ea"/>
+              <a:ea typeface="+mj-ea"/>
+              <a:cs typeface="+mj-ea"/>
+            </a:endParaRPr>
+          </a:p>
+          <a:p>
+            <a:endParaRPr lang="en-US" altLang="zh-CN" sz="2000">
+              <a:latin typeface="+mj-ea"/>
+              <a:ea typeface="+mj-ea"/>
+              <a:cs typeface="+mj-ea"/>
+            </a:endParaRPr>
+          </a:p>
+          <a:p>
+            <a:r>
+              <a:rPr lang="en-US" altLang="zh-CN" sz="2000">
+                <a:latin typeface="+mj-ea"/>
+                <a:ea typeface="+mj-ea"/>
+                <a:cs typeface="+mj-ea"/>
+              </a:rPr>
+              <a:t>3. Currently our symbolic evaluator supports only non-jump instructions, and does not support any instructions which access memory</a:t>
+            </a:r>
+            <a:endParaRPr lang="en-US" altLang="zh-CN" sz="2000">
+              <a:latin typeface="+mj-ea"/>
+              <a:ea typeface="+mj-ea"/>
+              <a:cs typeface="+mj-ea"/>
+            </a:endParaRPr>
+          </a:p>
+        </p:txBody>
+      </p:sp>
+    </p:spTree>
+  </p:cSld>
+  <p:clrMapOvr>
+    <a:masterClrMapping/>
+  </p:clrMapOvr>
+</p:sld>
+</file>
+
+<file path=ppt/slides/slide2.xml><?xml version="1.0" encoding="utf-8"?>
+<p:sld xmlns:a="http://schemas.openxmlformats.org/drawingml/2006/main" xmlns:r="http://schemas.openxmlformats.org/officeDocument/2006/relationships" xmlns:p="http://schemas.openxmlformats.org/presentationml/2006/main">
+  <p:cSld>
+    <p:spTree>
+      <p:nvGrpSpPr>
+        <p:cNvPr id="1" name=""/>
+        <p:cNvGrpSpPr/>
+        <p:nvPr/>
+      </p:nvGrpSpPr>
+      <p:grpSpPr>
+        <a:xfrm>
+          <a:off x="0" y="0"/>
+          <a:ext cx="0" cy="0"/>
+          <a:chOff x="0" y="0"/>
+          <a:chExt cx="0" cy="0"/>
+        </a:xfrm>
+      </p:grpSpPr>
+      <p:sp>
+        <p:nvSpPr>
+          <p:cNvPr id="4" name="文本框 3"/>
+          <p:cNvSpPr txBox="1"/>
+          <p:nvPr/>
+        </p:nvSpPr>
+        <p:spPr>
+          <a:xfrm>
+            <a:off x="226060" y="6136005"/>
+            <a:ext cx="6416040" cy="306705"/>
+          </a:xfrm>
+          <a:prstGeom prst="rect">
+            <a:avLst/>
+          </a:prstGeom>
+          <a:noFill/>
+        </p:spPr>
+        <p:txBody>
+          <a:bodyPr wrap="square" rtlCol="0">
+            <a:spAutoFit/>
+          </a:bodyPr>
+          <a:p>
+            <a:pPr algn="l"/>
+            <a:r>
+              <a:rPr lang="en-US" altLang="zh-CN" sz="1400"/>
+              <a:t>[2] </a:t>
+            </a:r>
+            <a:r>
+              <a:rPr sz="1400"/>
+              <a:t>Automatic Generation of Peephole Superoptimizers</a:t>
+            </a:r>
+            <a:r>
+              <a:rPr lang="en-US" sz="1400"/>
+              <a:t>, Stanford, 2006</a:t>
+            </a:r>
+            <a:endParaRPr lang="en-US" sz="1400"/>
+          </a:p>
+        </p:txBody>
+      </p:sp>
+      <p:sp>
+        <p:nvSpPr>
+          <p:cNvPr id="9" name="文本框 8"/>
+          <p:cNvSpPr txBox="1"/>
+          <p:nvPr/>
+        </p:nvSpPr>
+        <p:spPr>
+          <a:xfrm>
+            <a:off x="5241925" y="146050"/>
+            <a:ext cx="2229485" cy="706755"/>
+          </a:xfrm>
+          <a:prstGeom prst="rect">
+            <a:avLst/>
+          </a:prstGeom>
+          <a:noFill/>
+        </p:spPr>
+        <p:txBody>
+          <a:bodyPr wrap="square" rtlCol="0">
+            <a:spAutoFit/>
+          </a:bodyPr>
+          <a:p>
+            <a:r>
+              <a:rPr lang="en-US" altLang="zh-CN" sz="4000"/>
+              <a:t>peephole</a:t>
+            </a:r>
+            <a:endParaRPr lang="en-US" altLang="zh-CN" sz="4000"/>
+          </a:p>
+        </p:txBody>
+      </p:sp>
+      <p:sp>
+        <p:nvSpPr>
+          <p:cNvPr id="11" name="文本框 10"/>
+          <p:cNvSpPr txBox="1"/>
+          <p:nvPr/>
+        </p:nvSpPr>
+        <p:spPr>
+          <a:xfrm>
+            <a:off x="424815" y="852805"/>
+            <a:ext cx="8601075" cy="2553335"/>
+          </a:xfrm>
+          <a:prstGeom prst="rect">
+            <a:avLst/>
+          </a:prstGeom>
+          <a:noFill/>
+        </p:spPr>
+        <p:txBody>
+          <a:bodyPr wrap="square" rtlCol="0">
+            <a:spAutoFit/>
+          </a:bodyPr>
+          <a:p>
+            <a:r>
+              <a:rPr lang="en-US" altLang="zh-CN" sz="2000">
+                <a:latin typeface="+mj-ea"/>
+                <a:ea typeface="+mj-ea"/>
+                <a:cs typeface="+mj-ea"/>
+              </a:rPr>
+              <a:t>1.</a:t>
+            </a:r>
+            <a:r>
+              <a:rPr lang="en-US" sz="2000">
+                <a:latin typeface="+mj-ea"/>
+                <a:ea typeface="+mj-ea"/>
+                <a:cs typeface="+mj-ea"/>
+              </a:rPr>
+              <a:t>This paper explore a different approach to </a:t>
+            </a:r>
+            <a:r>
+              <a:rPr lang="en-US" sz="2000">
+                <a:solidFill>
+                  <a:srgbClr val="FF0000"/>
+                </a:solidFill>
+                <a:latin typeface="+mj-ea"/>
+                <a:ea typeface="+mj-ea"/>
+                <a:cs typeface="+mj-ea"/>
+              </a:rPr>
+              <a:t>automaticly</a:t>
+            </a:r>
+            <a:r>
+              <a:rPr lang="en-US" sz="2000">
+                <a:latin typeface="+mj-ea"/>
+                <a:ea typeface="+mj-ea"/>
+                <a:cs typeface="+mj-ea"/>
+              </a:rPr>
+              <a:t> build peephole optimizer by using </a:t>
+            </a:r>
+            <a:r>
+              <a:rPr lang="en-US" sz="2000">
+                <a:solidFill>
+                  <a:srgbClr val="FF0000"/>
+                </a:solidFill>
+                <a:latin typeface="+mj-ea"/>
+                <a:ea typeface="+mj-ea"/>
+                <a:cs typeface="+mj-ea"/>
+              </a:rPr>
+              <a:t>superoptimization </a:t>
+            </a:r>
+            <a:r>
+              <a:rPr lang="en-US" sz="2000">
+                <a:latin typeface="+mj-ea"/>
+                <a:ea typeface="+mj-ea"/>
+                <a:cs typeface="+mj-ea"/>
+              </a:rPr>
+              <a:t>techniques in off-line.</a:t>
+            </a:r>
+            <a:endParaRPr lang="en-US" altLang="zh-CN" sz="2000">
+              <a:latin typeface="+mj-ea"/>
+              <a:ea typeface="+mj-ea"/>
+              <a:cs typeface="+mj-ea"/>
+            </a:endParaRPr>
+          </a:p>
+          <a:p>
+            <a:endParaRPr lang="en-US" altLang="zh-CN" sz="2000">
+              <a:latin typeface="+mj-ea"/>
+              <a:ea typeface="+mj-ea"/>
+              <a:cs typeface="+mj-ea"/>
+            </a:endParaRPr>
+          </a:p>
+          <a:p>
+            <a:r>
+              <a:rPr lang="en-US" altLang="zh-CN" sz="2000">
+                <a:latin typeface="+mj-ea"/>
+                <a:ea typeface="+mj-ea"/>
+                <a:cs typeface="+mj-ea"/>
+              </a:rPr>
+              <a:t>2. The optimization are organized into a</a:t>
+            </a:r>
+            <a:r>
+              <a:rPr lang="en-US" altLang="zh-CN" sz="2000">
+                <a:solidFill>
+                  <a:srgbClr val="FF0000"/>
+                </a:solidFill>
+                <a:latin typeface="+mj-ea"/>
+                <a:ea typeface="+mj-ea"/>
+                <a:cs typeface="+mj-ea"/>
+              </a:rPr>
+              <a:t> lookup table,</a:t>
+            </a:r>
+            <a:r>
+              <a:rPr lang="en-US" altLang="zh-CN" sz="2000">
+                <a:latin typeface="+mj-ea"/>
+                <a:ea typeface="+mj-ea"/>
+                <a:cs typeface="+mj-ea"/>
+              </a:rPr>
+              <a:t> mapping guest sequenses to host sequeneces.</a:t>
+            </a:r>
+            <a:endParaRPr lang="en-US" altLang="zh-CN" sz="2000">
+              <a:latin typeface="+mj-ea"/>
+              <a:ea typeface="+mj-ea"/>
+              <a:cs typeface="+mj-ea"/>
+            </a:endParaRPr>
+          </a:p>
+          <a:p>
+            <a:r>
+              <a:rPr lang="en-US" altLang="zh-CN" sz="2000">
+                <a:latin typeface="+mj-ea"/>
+                <a:ea typeface="+mj-ea"/>
+                <a:cs typeface="+mj-ea"/>
+              </a:rPr>
+              <a:t> </a:t>
+            </a:r>
+            <a:endParaRPr lang="en-US" altLang="zh-CN" sz="2000">
+              <a:latin typeface="+mj-ea"/>
+              <a:ea typeface="+mj-ea"/>
+              <a:cs typeface="+mj-ea"/>
+            </a:endParaRPr>
+          </a:p>
+          <a:p>
+            <a:r>
+              <a:rPr lang="en-US" altLang="zh-CN" sz="2000">
+                <a:latin typeface="+mj-ea"/>
+                <a:ea typeface="+mj-ea"/>
+                <a:cs typeface="+mj-ea"/>
+              </a:rPr>
+              <a:t>3.自动生成guest 到host的映射指令序列，并作为一条规则放到查找表中，需要优化的时候，进行查表，根据源指令序列查找优化后的指令序列进行替换</a:t>
+            </a:r>
+            <a:endParaRPr lang="en-US" altLang="zh-CN" sz="2000">
+              <a:latin typeface="+mj-ea"/>
+              <a:ea typeface="+mj-ea"/>
+              <a:cs typeface="+mj-ea"/>
+            </a:endParaRPr>
+          </a:p>
+        </p:txBody>
+      </p:sp>
+      <p:pic>
+        <p:nvPicPr>
+          <p:cNvPr id="3" name="图片 2" descr="2022-04-15 17-28-05 的屏幕截图"/>
+          <p:cNvPicPr>
+            <a:picLocks noChangeAspect="1"/>
+          </p:cNvPicPr>
+          <p:nvPr/>
+        </p:nvPicPr>
+        <p:blipFill>
+          <a:blip r:embed="rId1"/>
+          <a:stretch>
+            <a:fillRect/>
+          </a:stretch>
+        </p:blipFill>
+        <p:spPr>
+          <a:xfrm>
+            <a:off x="5593080" y="3714115"/>
+            <a:ext cx="5328920" cy="2656205"/>
+          </a:xfrm>
+          <a:prstGeom prst="rect">
+            <a:avLst/>
+          </a:prstGeom>
+        </p:spPr>
+      </p:pic>
+    </p:spTree>
+  </p:cSld>
+  <p:clrMapOvr>
+    <a:masterClrMapping/>
+  </p:clrMapOvr>
+</p:sld>
+</file>
+
+<file path=ppt/slides/slide3.xml><?xml version="1.0" encoding="utf-8"?>
+<p:sld xmlns:a="http://schemas.openxmlformats.org/drawingml/2006/main" xmlns:r="http://schemas.openxmlformats.org/officeDocument/2006/relationships" xmlns:p="http://schemas.openxmlformats.org/presentationml/2006/main">
+  <p:cSld>
+    <p:spTree>
+      <p:nvGrpSpPr>
+        <p:cNvPr id="1" name=""/>
+        <p:cNvGrpSpPr/>
+        <p:nvPr/>
+      </p:nvGrpSpPr>
+      <p:grpSpPr>
+        <a:xfrm>
+          <a:off x="0" y="0"/>
+          <a:ext cx="0" cy="0"/>
+          <a:chOff x="0" y="0"/>
+          <a:chExt cx="0" cy="0"/>
+        </a:xfrm>
+      </p:grpSpPr>
+      <p:sp>
+        <p:nvSpPr>
+          <p:cNvPr id="4" name="文本框 3"/>
+          <p:cNvSpPr txBox="1"/>
+          <p:nvPr/>
+        </p:nvSpPr>
+        <p:spPr>
+          <a:xfrm>
+            <a:off x="226060" y="6136005"/>
+            <a:ext cx="6416040" cy="306705"/>
+          </a:xfrm>
+          <a:prstGeom prst="rect">
+            <a:avLst/>
+          </a:prstGeom>
+          <a:noFill/>
+        </p:spPr>
+        <p:txBody>
+          <a:bodyPr wrap="square" rtlCol="0">
+            <a:spAutoFit/>
+          </a:bodyPr>
+          <a:p>
+            <a:pPr algn="l"/>
+            <a:r>
+              <a:rPr lang="en-US" altLang="zh-CN" sz="1400"/>
+              <a:t>[1] </a:t>
+            </a:r>
+            <a:r>
+              <a:rPr sz="1400"/>
+              <a:t>Peek: A Formally Verified Peephole</a:t>
+            </a:r>
+            <a:r>
+              <a:rPr lang="en-US" sz="1400"/>
+              <a:t> </a:t>
+            </a:r>
+            <a:r>
+              <a:rPr sz="1400"/>
+              <a:t>Optimization Framework for x86</a:t>
+            </a:r>
+            <a:endParaRPr sz="1400"/>
+          </a:p>
+        </p:txBody>
+      </p:sp>
+      <p:sp>
+        <p:nvSpPr>
+          <p:cNvPr id="6" name="文本框 5"/>
+          <p:cNvSpPr txBox="1"/>
+          <p:nvPr/>
+        </p:nvSpPr>
+        <p:spPr>
+          <a:xfrm>
+            <a:off x="8256270" y="2308225"/>
+            <a:ext cx="560705" cy="368300"/>
+          </a:xfrm>
+          <a:prstGeom prst="rect">
+            <a:avLst/>
+          </a:prstGeom>
+          <a:noFill/>
+        </p:spPr>
+        <p:txBody>
+          <a:bodyPr wrap="square" rtlCol="0">
+            <a:spAutoFit/>
+          </a:bodyPr>
+          <a:p>
+            <a:r>
               <a:rPr lang="en-US" altLang="zh-CN"/>
+              <a:t>[1]</a:t>
+            </a:r>
+            <a:endParaRPr lang="en-US" altLang="zh-CN"/>
+          </a:p>
+        </p:txBody>
+      </p:sp>
+      <p:sp>
+        <p:nvSpPr>
+          <p:cNvPr id="9" name="文本框 8"/>
+          <p:cNvSpPr txBox="1"/>
+          <p:nvPr/>
+        </p:nvSpPr>
+        <p:spPr>
+          <a:xfrm>
+            <a:off x="5241925" y="146050"/>
+            <a:ext cx="2229485" cy="706755"/>
+          </a:xfrm>
+          <a:prstGeom prst="rect">
+            <a:avLst/>
+          </a:prstGeom>
+          <a:noFill/>
+        </p:spPr>
+        <p:txBody>
+          <a:bodyPr wrap="square" rtlCol="0">
+            <a:spAutoFit/>
+          </a:bodyPr>
+          <a:p>
+            <a:r>
+              <a:rPr lang="en-US" altLang="zh-CN" sz="4000"/>
+              <a:t>peephole</a:t>
+            </a:r>
+            <a:endParaRPr lang="en-US" altLang="zh-CN" sz="4000"/>
+          </a:p>
+        </p:txBody>
+      </p:sp>
+      <p:sp>
+        <p:nvSpPr>
+          <p:cNvPr id="11" name="文本框 10"/>
+          <p:cNvSpPr txBox="1"/>
+          <p:nvPr/>
+        </p:nvSpPr>
+        <p:spPr>
+          <a:xfrm>
+            <a:off x="513080" y="2005965"/>
+            <a:ext cx="8601075" cy="2553335"/>
+          </a:xfrm>
+          <a:prstGeom prst="rect">
+            <a:avLst/>
+          </a:prstGeom>
+          <a:noFill/>
+        </p:spPr>
+        <p:txBody>
+          <a:bodyPr wrap="square" rtlCol="0">
+            <a:spAutoFit/>
+          </a:bodyPr>
+          <a:p>
+            <a:r>
+              <a:rPr lang="en-US" altLang="zh-CN" sz="2000">
+                <a:latin typeface="+mj-ea"/>
+                <a:ea typeface="+mj-ea"/>
+                <a:cs typeface="+mj-ea"/>
+              </a:rPr>
               <a:t>1.Peek is a first step toward adding support for assembly-level program analyses, transformations, and optimizations in CompCert: </a:t>
             </a:r>
             <a:r>
-              <a:rPr sz="1400"/>
+              <a:rPr sz="2000">
+                <a:latin typeface="+mj-ea"/>
+                <a:ea typeface="+mj-ea"/>
+                <a:cs typeface="+mj-ea"/>
+              </a:rPr>
               <a:t>https://compcert.org/</a:t>
             </a:r>
-            <a:endParaRPr sz="1400"/>
-          </a:p>
-          <a:p>
-            <a:endParaRPr lang="en-US" altLang="zh-CN" sz="1400"/>
-          </a:p>
-          <a:p>
-            <a:r>
-              <a:rPr lang="en-US" altLang="zh-CN" sz="1400"/>
+            <a:endParaRPr sz="2000">
+              <a:latin typeface="+mj-ea"/>
+              <a:ea typeface="+mj-ea"/>
+              <a:cs typeface="+mj-ea"/>
+            </a:endParaRPr>
+          </a:p>
+          <a:p>
+            <a:endParaRPr lang="en-US" altLang="zh-CN" sz="2000">
+              <a:latin typeface="+mj-ea"/>
+              <a:ea typeface="+mj-ea"/>
+              <a:cs typeface="+mj-ea"/>
+            </a:endParaRPr>
+          </a:p>
+          <a:p>
+            <a:r>
+              <a:rPr lang="en-US" altLang="zh-CN" sz="2000">
+                <a:latin typeface="+mj-ea"/>
+                <a:ea typeface="+mj-ea"/>
+                <a:cs typeface="+mj-ea"/>
+              </a:rPr>
               <a:t>2. </a:t>
             </a:r>
             <a:r>
-              <a:t>Peekprovides an x86-level liveness analysis over registers</a:t>
-            </a:r>
-          </a:p>
-          <a:p>
-            <a:r>
-              <a:rPr lang="zh-CN" altLang="en-US" sz="1400"/>
+              <a:rPr sz="2000">
+                <a:latin typeface="+mj-ea"/>
+                <a:ea typeface="+mj-ea"/>
+                <a:cs typeface="+mj-ea"/>
+              </a:rPr>
+              <a:t>Peek</a:t>
+            </a:r>
+            <a:r>
+              <a:rPr lang="en-US" sz="2000">
+                <a:latin typeface="+mj-ea"/>
+                <a:ea typeface="+mj-ea"/>
+                <a:cs typeface="+mj-ea"/>
+              </a:rPr>
+              <a:t> </a:t>
+            </a:r>
+            <a:r>
+              <a:rPr sz="2000">
+                <a:latin typeface="+mj-ea"/>
+                <a:ea typeface="+mj-ea"/>
+                <a:cs typeface="+mj-ea"/>
+              </a:rPr>
+              <a:t>provides an x86-level liveness analysis over registers</a:t>
+            </a:r>
+            <a:endParaRPr sz="2000">
+              <a:latin typeface="+mj-ea"/>
+              <a:ea typeface="+mj-ea"/>
+              <a:cs typeface="+mj-ea"/>
+            </a:endParaRPr>
+          </a:p>
+          <a:p>
+            <a:r>
+              <a:rPr lang="zh-CN" altLang="en-US" sz="2000">
+                <a:latin typeface="+mj-ea"/>
+                <a:ea typeface="+mj-ea"/>
+                <a:cs typeface="+mj-ea"/>
+              </a:rPr>
               <a:t>把寄存器分成</a:t>
             </a:r>
             <a:r>
-              <a:rPr lang="en-US" altLang="zh-CN" sz="1400"/>
+              <a:rPr lang="en-US" altLang="zh-CN" sz="2000">
+                <a:latin typeface="+mj-ea"/>
+                <a:ea typeface="+mj-ea"/>
+                <a:cs typeface="+mj-ea"/>
+              </a:rPr>
               <a:t>live_in </a:t>
             </a:r>
             <a:r>
-              <a:rPr lang="zh-CN" altLang="en-US" sz="1400"/>
+              <a:rPr lang="zh-CN" altLang="en-US" sz="2000">
+                <a:latin typeface="+mj-ea"/>
+                <a:ea typeface="+mj-ea"/>
+                <a:cs typeface="+mj-ea"/>
+              </a:rPr>
               <a:t>，</a:t>
             </a:r>
             <a:r>
-              <a:rPr lang="en-US" altLang="zh-CN" sz="1400"/>
+              <a:rPr lang="en-US" altLang="zh-CN" sz="2000">
+                <a:latin typeface="+mj-ea"/>
+                <a:ea typeface="+mj-ea"/>
+                <a:cs typeface="+mj-ea"/>
+              </a:rPr>
               <a:t>live_out</a:t>
             </a:r>
             <a:r>
-              <a:rPr lang="zh-CN" altLang="en-US" sz="1400"/>
+              <a:rPr lang="zh-CN" altLang="en-US" sz="2000">
+                <a:latin typeface="+mj-ea"/>
+                <a:ea typeface="+mj-ea"/>
+                <a:cs typeface="+mj-ea"/>
+              </a:rPr>
               <a:t>，</a:t>
             </a:r>
             <a:r>
-              <a:rPr lang="en-US" altLang="zh-CN" sz="1400"/>
+              <a:rPr lang="en-US" altLang="zh-CN" sz="2000">
+                <a:latin typeface="+mj-ea"/>
+                <a:ea typeface="+mj-ea"/>
+                <a:cs typeface="+mj-ea"/>
+              </a:rPr>
               <a:t> pres(</a:t>
             </a:r>
             <a:r>
-              <a:rPr lang="zh-CN" altLang="en-US" sz="1400"/>
+              <a:rPr lang="zh-CN" altLang="en-US" sz="2000">
+                <a:latin typeface="+mj-ea"/>
+                <a:ea typeface="+mj-ea"/>
+                <a:cs typeface="+mj-ea"/>
+              </a:rPr>
               <a:t>没有影响的寄存器列表</a:t>
             </a:r>
             <a:r>
-              <a:rPr lang="en-US" altLang="zh-CN" sz="1400"/>
+              <a:rPr lang="en-US" altLang="zh-CN" sz="2000">
+                <a:latin typeface="+mj-ea"/>
+                <a:ea typeface="+mj-ea"/>
+                <a:cs typeface="+mj-ea"/>
+              </a:rPr>
               <a:t>)</a:t>
             </a:r>
-            <a:endParaRPr lang="en-US" altLang="zh-CN" sz="1400"/>
-          </a:p>
-          <a:p>
-            <a:endParaRPr lang="en-US" altLang="zh-CN" sz="1400"/>
-          </a:p>
-          <a:p>
-            <a:r>
-              <a:rPr lang="en-US" altLang="zh-CN" sz="1400"/>
-              <a:t>3. </a:t>
-            </a:r>
-            <a:r>
-              <a:rPr lang="en-US" altLang="zh-CN"/>
-              <a:t>Currently our symbolic evaluator supports only non-jump instructions, and does not support any instructions which access memory</a:t>
-            </a:r>
-            <a:endParaRPr lang="en-US" altLang="zh-CN"/>
+            <a:endParaRPr lang="en-US" altLang="zh-CN" sz="2000">
+              <a:latin typeface="+mj-ea"/>
+              <a:ea typeface="+mj-ea"/>
+              <a:cs typeface="+mj-ea"/>
+            </a:endParaRPr>
+          </a:p>
+          <a:p>
+            <a:endParaRPr lang="en-US" altLang="zh-CN" sz="2000">
+              <a:latin typeface="+mj-ea"/>
+              <a:ea typeface="+mj-ea"/>
+              <a:cs typeface="+mj-ea"/>
+            </a:endParaRPr>
+          </a:p>
+          <a:p>
+            <a:r>
+              <a:rPr lang="en-US" altLang="zh-CN" sz="2000">
+                <a:latin typeface="+mj-ea"/>
+                <a:ea typeface="+mj-ea"/>
+                <a:cs typeface="+mj-ea"/>
+              </a:rPr>
+              <a:t>3. Currently our symbolic evaluator supports only non-jump instructions, and does not support any instructions which access memory</a:t>
+            </a:r>
+            <a:endParaRPr lang="en-US" altLang="zh-CN" sz="2000">
+              <a:latin typeface="+mj-ea"/>
+              <a:ea typeface="+mj-ea"/>
+              <a:cs typeface="+mj-ea"/>
+            </a:endParaRPr>
           </a:p>
         </p:txBody>
       </p:sp>

</xml_diff>